<commit_message>
"add Picture and Class Meta"
</commit_message>
<xml_diff>
--- a/MEMO Djano Ecommerce.pptx
+++ b/MEMO Djano Ecommerce.pptx
@@ -9,8 +9,8 @@
     <p:sldId id="257" r:id="rId3"/>
     <p:sldId id="258" r:id="rId4"/>
     <p:sldId id="259" r:id="rId5"/>
-    <p:sldId id="260" r:id="rId6"/>
-    <p:sldId id="261" r:id="rId7"/>
+    <p:sldId id="261" r:id="rId6"/>
+    <p:sldId id="260" r:id="rId7"/>
   </p:sldIdLst>
   <p:sldSz cx="12192000" cy="6858000"/>
   <p:notesSz cx="6858000" cy="9144000"/>
@@ -272,7 +272,7 @@
           <a:p>
             <a:fld id="{88FB9E02-EF2F-45E8-9C52-8DD8EBAD47A3}" type="datetimeFigureOut">
               <a:rPr lang="en-US" smtClean="0"/>
-              <a:t>8/10/2023</a:t>
+              <a:t>8/12/2023</a:t>
             </a:fld>
             <a:endParaRPr lang="en-US"/>
           </a:p>
@@ -470,7 +470,7 @@
           <a:p>
             <a:fld id="{88FB9E02-EF2F-45E8-9C52-8DD8EBAD47A3}" type="datetimeFigureOut">
               <a:rPr lang="en-US" smtClean="0"/>
-              <a:t>8/10/2023</a:t>
+              <a:t>8/12/2023</a:t>
             </a:fld>
             <a:endParaRPr lang="en-US"/>
           </a:p>
@@ -678,7 +678,7 @@
           <a:p>
             <a:fld id="{88FB9E02-EF2F-45E8-9C52-8DD8EBAD47A3}" type="datetimeFigureOut">
               <a:rPr lang="en-US" smtClean="0"/>
-              <a:t>8/10/2023</a:t>
+              <a:t>8/12/2023</a:t>
             </a:fld>
             <a:endParaRPr lang="en-US"/>
           </a:p>
@@ -876,7 +876,7 @@
           <a:p>
             <a:fld id="{88FB9E02-EF2F-45E8-9C52-8DD8EBAD47A3}" type="datetimeFigureOut">
               <a:rPr lang="en-US" smtClean="0"/>
-              <a:t>8/10/2023</a:t>
+              <a:t>8/12/2023</a:t>
             </a:fld>
             <a:endParaRPr lang="en-US"/>
           </a:p>
@@ -1151,7 +1151,7 @@
           <a:p>
             <a:fld id="{88FB9E02-EF2F-45E8-9C52-8DD8EBAD47A3}" type="datetimeFigureOut">
               <a:rPr lang="en-US" smtClean="0"/>
-              <a:t>8/10/2023</a:t>
+              <a:t>8/12/2023</a:t>
             </a:fld>
             <a:endParaRPr lang="en-US"/>
           </a:p>
@@ -1416,7 +1416,7 @@
           <a:p>
             <a:fld id="{88FB9E02-EF2F-45E8-9C52-8DD8EBAD47A3}" type="datetimeFigureOut">
               <a:rPr lang="en-US" smtClean="0"/>
-              <a:t>8/10/2023</a:t>
+              <a:t>8/12/2023</a:t>
             </a:fld>
             <a:endParaRPr lang="en-US"/>
           </a:p>
@@ -1828,7 +1828,7 @@
           <a:p>
             <a:fld id="{88FB9E02-EF2F-45E8-9C52-8DD8EBAD47A3}" type="datetimeFigureOut">
               <a:rPr lang="en-US" smtClean="0"/>
-              <a:t>8/10/2023</a:t>
+              <a:t>8/12/2023</a:t>
             </a:fld>
             <a:endParaRPr lang="en-US"/>
           </a:p>
@@ -1969,7 +1969,7 @@
           <a:p>
             <a:fld id="{88FB9E02-EF2F-45E8-9C52-8DD8EBAD47A3}" type="datetimeFigureOut">
               <a:rPr lang="en-US" smtClean="0"/>
-              <a:t>8/10/2023</a:t>
+              <a:t>8/12/2023</a:t>
             </a:fld>
             <a:endParaRPr lang="en-US"/>
           </a:p>
@@ -2082,7 +2082,7 @@
           <a:p>
             <a:fld id="{88FB9E02-EF2F-45E8-9C52-8DD8EBAD47A3}" type="datetimeFigureOut">
               <a:rPr lang="en-US" smtClean="0"/>
-              <a:t>8/10/2023</a:t>
+              <a:t>8/12/2023</a:t>
             </a:fld>
             <a:endParaRPr lang="en-US"/>
           </a:p>
@@ -2393,7 +2393,7 @@
           <a:p>
             <a:fld id="{88FB9E02-EF2F-45E8-9C52-8DD8EBAD47A3}" type="datetimeFigureOut">
               <a:rPr lang="en-US" smtClean="0"/>
-              <a:t>8/10/2023</a:t>
+              <a:t>8/12/2023</a:t>
             </a:fld>
             <a:endParaRPr lang="en-US"/>
           </a:p>
@@ -2681,7 +2681,7 @@
           <a:p>
             <a:fld id="{88FB9E02-EF2F-45E8-9C52-8DD8EBAD47A3}" type="datetimeFigureOut">
               <a:rPr lang="en-US" smtClean="0"/>
-              <a:t>8/10/2023</a:t>
+              <a:t>8/12/2023</a:t>
             </a:fld>
             <a:endParaRPr lang="en-US"/>
           </a:p>
@@ -2922,7 +2922,7 @@
           <a:p>
             <a:fld id="{88FB9E02-EF2F-45E8-9C52-8DD8EBAD47A3}" type="datetimeFigureOut">
               <a:rPr lang="en-US" smtClean="0"/>
-              <a:t>8/10/2023</a:t>
+              <a:t>8/12/2023</a:t>
             </a:fld>
             <a:endParaRPr lang="en-US"/>
           </a:p>
@@ -3354,7 +3354,7 @@
         <p:spPr>
           <a:xfrm>
             <a:off x="1058238" y="873303"/>
-            <a:ext cx="3583225" cy="1200329"/>
+            <a:ext cx="5037148" cy="1200329"/>
           </a:xfrm>
           <a:prstGeom prst="rect">
             <a:avLst/>
@@ -3373,7 +3373,7 @@
             </a:pPr>
             <a:r>
               <a:rPr lang="en-US" dirty="0"/>
-              <a:t>The Project run on Dell notebook</a:t>
+              <a:t>The Project run on Dell notebook ( Aug-12-2023)</a:t>
             </a:r>
           </a:p>
           <a:p>
@@ -3393,7 +3393,7 @@
             </a:pPr>
             <a:r>
               <a:rPr lang="en-US" dirty="0"/>
-              <a:t>Problem can not see </a:t>
+              <a:t>Found Problem can not see </a:t>
             </a:r>
           </a:p>
           <a:p>
@@ -3742,88 +3742,40 @@
           <a:chExt cx="0" cy="0"/>
         </a:xfrm>
       </p:grpSpPr>
-      <p:sp>
-        <p:nvSpPr>
-          <p:cNvPr id="5" name="TextBox 4">
-            <a:extLst>
-              <a:ext uri="{FF2B5EF4-FFF2-40B4-BE49-F238E27FC236}">
-                <a16:creationId xmlns:a16="http://schemas.microsoft.com/office/drawing/2014/main" id="{7A1448F8-36C9-11C1-9634-C3DF913E5995}"/>
-              </a:ext>
-            </a:extLst>
-          </p:cNvPr>
-          <p:cNvSpPr txBox="1"/>
+      <p:pic>
+        <p:nvPicPr>
+          <p:cNvPr id="5" name="Picture 4">
+            <a:extLst>
+              <a:ext uri="{FF2B5EF4-FFF2-40B4-BE49-F238E27FC236}">
+                <a16:creationId xmlns:a16="http://schemas.microsoft.com/office/drawing/2014/main" id="{56EF2BAC-CB50-C68C-AF2A-9B4CDA1FFF49}"/>
+              </a:ext>
+            </a:extLst>
+          </p:cNvPr>
+          <p:cNvPicPr>
+            <a:picLocks noChangeAspect="1"/>
+          </p:cNvPicPr>
           <p:nvPr/>
-        </p:nvSpPr>
+        </p:nvPicPr>
+        <p:blipFill>
+          <a:blip r:embed="rId2"/>
+          <a:stretch>
+            <a:fillRect/>
+          </a:stretch>
+        </p:blipFill>
         <p:spPr>
           <a:xfrm>
-            <a:off x="658762" y="388655"/>
-            <a:ext cx="10481186" cy="1754326"/>
+            <a:off x="766452" y="299469"/>
+            <a:ext cx="10310519" cy="5944430"/>
           </a:xfrm>
           <a:prstGeom prst="rect">
             <a:avLst/>
           </a:prstGeom>
-          <a:noFill/>
         </p:spPr>
-        <p:txBody>
-          <a:bodyPr wrap="square">
-            <a:spAutoFit/>
-          </a:bodyPr>
-          <a:lstStyle/>
-          <a:p>
-            <a:r>
-              <a:rPr lang="en-US" dirty="0"/>
-              <a:t>Microsoft Windows [Version 10.0.19045.3208]</a:t>
-            </a:r>
-          </a:p>
-          <a:p>
-            <a:r>
-              <a:rPr lang="en-US" dirty="0"/>
-              <a:t>(c) Microsoft Corporation. All rights reserved.</a:t>
-            </a:r>
-          </a:p>
-          <a:p>
-            <a:endParaRPr lang="en-US" dirty="0"/>
-          </a:p>
-          <a:p>
-            <a:r>
-              <a:rPr lang="en-US" dirty="0"/>
-              <a:t>C:\Users\339073\OneDrive\WEBDEVELOP2023\Django_Ecommerce_02&gt;witaya_ecom\Scripts\activate.bat</a:t>
-            </a:r>
-          </a:p>
-          <a:p>
-            <a:r>
-              <a:rPr lang="en-US" dirty="0"/>
-              <a:t>(</a:t>
-            </a:r>
-            <a:r>
-              <a:rPr lang="en-US" dirty="0" err="1"/>
-              <a:t>witaya_ecom</a:t>
-            </a:r>
-            <a:r>
-              <a:rPr lang="en-US" dirty="0"/>
-              <a:t>) C:\Users\339073\OneDrive\WEBDEVELOP2023\Django_Ecommerce_02&gt;</a:t>
-            </a:r>
-          </a:p>
-          <a:p>
-            <a:r>
-              <a:rPr lang="en-US" dirty="0"/>
-              <a:t>(</a:t>
-            </a:r>
-            <a:r>
-              <a:rPr lang="en-US" dirty="0" err="1"/>
-              <a:t>witaya_ecom</a:t>
-            </a:r>
-            <a:r>
-              <a:rPr lang="en-US" dirty="0"/>
-              <a:t>) C:\Users\339073\OneDrive\WEBDEVELOP2023\Django_Ecommerce_02\djangoworkshop&gt;</a:t>
-            </a:r>
-          </a:p>
-        </p:txBody>
-      </p:sp>
+      </p:pic>
     </p:spTree>
     <p:extLst>
       <p:ext uri="{BB962C8B-B14F-4D97-AF65-F5344CB8AC3E}">
-        <p14:creationId xmlns:p14="http://schemas.microsoft.com/office/powerpoint/2010/main" val="616725202"/>
+        <p14:creationId xmlns:p14="http://schemas.microsoft.com/office/powerpoint/2010/main" val="720513010"/>
       </p:ext>
     </p:extLst>
   </p:cSld>
@@ -3850,40 +3802,93 @@
           <a:chExt cx="0" cy="0"/>
         </a:xfrm>
       </p:grpSpPr>
-      <p:pic>
-        <p:nvPicPr>
-          <p:cNvPr id="5" name="Picture 4">
-            <a:extLst>
-              <a:ext uri="{FF2B5EF4-FFF2-40B4-BE49-F238E27FC236}">
-                <a16:creationId xmlns:a16="http://schemas.microsoft.com/office/drawing/2014/main" id="{56EF2BAC-CB50-C68C-AF2A-9B4CDA1FFF49}"/>
-              </a:ext>
-            </a:extLst>
-          </p:cNvPr>
-          <p:cNvPicPr>
-            <a:picLocks noChangeAspect="1"/>
-          </p:cNvPicPr>
+      <p:sp>
+        <p:nvSpPr>
+          <p:cNvPr id="5" name="TextBox 4">
+            <a:extLst>
+              <a:ext uri="{FF2B5EF4-FFF2-40B4-BE49-F238E27FC236}">
+                <a16:creationId xmlns:a16="http://schemas.microsoft.com/office/drawing/2014/main" id="{7A1448F8-36C9-11C1-9634-C3DF913E5995}"/>
+              </a:ext>
+            </a:extLst>
+          </p:cNvPr>
+          <p:cNvSpPr txBox="1"/>
           <p:nvPr/>
-        </p:nvPicPr>
-        <p:blipFill>
-          <a:blip r:embed="rId2"/>
-          <a:stretch>
-            <a:fillRect/>
-          </a:stretch>
-        </p:blipFill>
+        </p:nvSpPr>
         <p:spPr>
           <a:xfrm>
-            <a:off x="766452" y="299469"/>
-            <a:ext cx="10310519" cy="5944430"/>
+            <a:off x="297951" y="388655"/>
+            <a:ext cx="11507056" cy="1754326"/>
           </a:xfrm>
           <a:prstGeom prst="rect">
             <a:avLst/>
           </a:prstGeom>
+          <a:noFill/>
         </p:spPr>
-      </p:pic>
+        <p:txBody>
+          <a:bodyPr wrap="square">
+            <a:spAutoFit/>
+          </a:bodyPr>
+          <a:lstStyle/>
+          <a:p>
+            <a:r>
+              <a:rPr lang="en-US" dirty="0"/>
+              <a:t>Microsoft Windows [Version 10.0.19045.3208]</a:t>
+            </a:r>
+          </a:p>
+          <a:p>
+            <a:r>
+              <a:rPr lang="en-US" dirty="0"/>
+              <a:t>(c) Microsoft Corporation. All rights reserved.</a:t>
+            </a:r>
+          </a:p>
+          <a:p>
+            <a:endParaRPr lang="en-US" dirty="0"/>
+          </a:p>
+          <a:p>
+            <a:r>
+              <a:rPr lang="en-US" dirty="0"/>
+              <a:t>C:\Users\339073\OneDrive\WEBDEVELOP2023\Django_Ecommerce_02&gt;python -m </a:t>
+            </a:r>
+            <a:r>
+              <a:rPr lang="en-US" dirty="0" err="1"/>
+              <a:t>venv</a:t>
+            </a:r>
+            <a:r>
+              <a:rPr lang="en-US" dirty="0"/>
+              <a:t> </a:t>
+            </a:r>
+            <a:r>
+              <a:rPr lang="en-US" b="1" dirty="0" err="1"/>
+              <a:t>witaya_ecom</a:t>
+            </a:r>
+            <a:endParaRPr lang="en-US" b="1" dirty="0"/>
+          </a:p>
+          <a:p>
+            <a:r>
+              <a:rPr lang="en-US" dirty="0"/>
+              <a:t>C:\Users\339073\OneDrive\WEBDEVELOP2023\Django_Ecommerce_02&gt;witaya_ecom\Scripts\activate.bat</a:t>
+            </a:r>
+          </a:p>
+          <a:p>
+            <a:r>
+              <a:rPr lang="en-US" dirty="0"/>
+              <a:t>(</a:t>
+            </a:r>
+            <a:r>
+              <a:rPr lang="en-US" dirty="0" err="1"/>
+              <a:t>witaya_ecom</a:t>
+            </a:r>
+            <a:r>
+              <a:rPr lang="en-US" dirty="0"/>
+              <a:t>) C:\Users\339073\OneDrive\WEBDEVELOP2023\Django_Ecommerce_02\djangoworkshop&gt;</a:t>
+            </a:r>
+          </a:p>
+        </p:txBody>
+      </p:sp>
     </p:spTree>
     <p:extLst>
       <p:ext uri="{BB962C8B-B14F-4D97-AF65-F5344CB8AC3E}">
-        <p14:creationId xmlns:p14="http://schemas.microsoft.com/office/powerpoint/2010/main" val="720513010"/>
+        <p14:creationId xmlns:p14="http://schemas.microsoft.com/office/powerpoint/2010/main" val="616725202"/>
       </p:ext>
     </p:extLst>
   </p:cSld>

</xml_diff>